<commit_message>
Artigo, BNF  e ppt atualizados
</commit_message>
<xml_diff>
--- a/Compilador da Linguagem Master-Killer.pptx
+++ b/Compilador da Linguagem Master-Killer.pptx
@@ -8,6 +8,11 @@
     <p:sldId id="256" r:id="rId2"/>
     <p:sldId id="257" r:id="rId3"/>
     <p:sldId id="258" r:id="rId4"/>
+    <p:sldId id="259" r:id="rId5"/>
+    <p:sldId id="260" r:id="rId6"/>
+    <p:sldId id="261" r:id="rId7"/>
+    <p:sldId id="262" r:id="rId8"/>
+    <p:sldId id="263" r:id="rId9"/>
   </p:sldIdLst>
   <p:sldSz cx="12192000" cy="6858000"/>
   <p:notesSz cx="6858000" cy="9144000"/>
@@ -298,7 +303,7 @@
             <a:fld id="{B61BEF0D-F0BB-DE4B-95CE-6DB70DBA9567}" type="datetimeFigureOut">
               <a:rPr lang="en-US" dirty="0"/>
               <a:pPr/>
-              <a:t>10/6/2016</a:t>
+              <a:t>10/12/2016</a:t>
             </a:fld>
             <a:endParaRPr lang="en-US" dirty="0"/>
           </a:p>
@@ -633,7 +638,7 @@
             <a:fld id="{B61BEF0D-F0BB-DE4B-95CE-6DB70DBA9567}" type="datetimeFigureOut">
               <a:rPr lang="en-US" dirty="0"/>
               <a:pPr/>
-              <a:t>10/6/2016</a:t>
+              <a:t>10/12/2016</a:t>
             </a:fld>
             <a:endParaRPr lang="en-US" dirty="0"/>
           </a:p>
@@ -1031,7 +1036,7 @@
             <a:fld id="{B61BEF0D-F0BB-DE4B-95CE-6DB70DBA9567}" type="datetimeFigureOut">
               <a:rPr lang="en-US" dirty="0"/>
               <a:pPr/>
-              <a:t>10/6/2016</a:t>
+              <a:t>10/12/2016</a:t>
             </a:fld>
             <a:endParaRPr lang="en-US" dirty="0"/>
           </a:p>
@@ -1364,7 +1369,7 @@
             <a:fld id="{B61BEF0D-F0BB-DE4B-95CE-6DB70DBA9567}" type="datetimeFigureOut">
               <a:rPr lang="en-US" dirty="0"/>
               <a:pPr/>
-              <a:t>10/6/2016</a:t>
+              <a:t>10/12/2016</a:t>
             </a:fld>
             <a:endParaRPr lang="en-US" dirty="0"/>
           </a:p>
@@ -1681,7 +1686,7 @@
             <a:fld id="{B61BEF0D-F0BB-DE4B-95CE-6DB70DBA9567}" type="datetimeFigureOut">
               <a:rPr lang="en-US" dirty="0"/>
               <a:pPr/>
-              <a:t>10/6/2016</a:t>
+              <a:t>10/12/2016</a:t>
             </a:fld>
             <a:endParaRPr lang="en-US" dirty="0"/>
           </a:p>
@@ -2074,7 +2079,7 @@
             <a:fld id="{B61BEF0D-F0BB-DE4B-95CE-6DB70DBA9567}" type="datetimeFigureOut">
               <a:rPr lang="en-US" dirty="0"/>
               <a:pPr/>
-              <a:t>10/6/2016</a:t>
+              <a:t>10/12/2016</a:t>
             </a:fld>
             <a:endParaRPr lang="en-US" dirty="0"/>
           </a:p>
@@ -2328,7 +2333,7 @@
             <a:fld id="{B61BEF0D-F0BB-DE4B-95CE-6DB70DBA9567}" type="datetimeFigureOut">
               <a:rPr lang="en-US" dirty="0"/>
               <a:pPr/>
-              <a:t>10/6/2016</a:t>
+              <a:t>10/12/2016</a:t>
             </a:fld>
             <a:endParaRPr lang="en-US" dirty="0"/>
           </a:p>
@@ -2587,7 +2592,7 @@
             <a:fld id="{B61BEF0D-F0BB-DE4B-95CE-6DB70DBA9567}" type="datetimeFigureOut">
               <a:rPr lang="en-US" dirty="0"/>
               <a:pPr/>
-              <a:t>10/6/2016</a:t>
+              <a:t>10/12/2016</a:t>
             </a:fld>
             <a:endParaRPr lang="en-US" dirty="0"/>
           </a:p>
@@ -2846,7 +2851,7 @@
             <a:fld id="{B61BEF0D-F0BB-DE4B-95CE-6DB70DBA9567}" type="datetimeFigureOut">
               <a:rPr lang="en-US" dirty="0"/>
               <a:pPr/>
-              <a:t>10/6/2016</a:t>
+              <a:t>10/12/2016</a:t>
             </a:fld>
             <a:endParaRPr lang="en-US" dirty="0"/>
           </a:p>
@@ -3172,7 +3177,7 @@
             <a:fld id="{B61BEF0D-F0BB-DE4B-95CE-6DB70DBA9567}" type="datetimeFigureOut">
               <a:rPr lang="en-US" dirty="0"/>
               <a:pPr/>
-              <a:t>10/6/2016</a:t>
+              <a:t>10/12/2016</a:t>
             </a:fld>
             <a:endParaRPr lang="en-US" dirty="0"/>
           </a:p>
@@ -3492,7 +3497,7 @@
             <a:fld id="{B61BEF0D-F0BB-DE4B-95CE-6DB70DBA9567}" type="datetimeFigureOut">
               <a:rPr lang="en-US" dirty="0"/>
               <a:pPr/>
-              <a:t>10/6/2016</a:t>
+              <a:t>10/12/2016</a:t>
             </a:fld>
             <a:endParaRPr lang="en-US" dirty="0"/>
           </a:p>
@@ -3946,7 +3951,7 @@
             <a:fld id="{B61BEF0D-F0BB-DE4B-95CE-6DB70DBA9567}" type="datetimeFigureOut">
               <a:rPr lang="en-US" dirty="0"/>
               <a:pPr/>
-              <a:t>10/6/2016</a:t>
+              <a:t>10/12/2016</a:t>
             </a:fld>
             <a:endParaRPr lang="en-US" dirty="0"/>
           </a:p>
@@ -4148,7 +4153,7 @@
             <a:fld id="{B61BEF0D-F0BB-DE4B-95CE-6DB70DBA9567}" type="datetimeFigureOut">
               <a:rPr lang="en-US" dirty="0"/>
               <a:pPr/>
-              <a:t>10/6/2016</a:t>
+              <a:t>10/12/2016</a:t>
             </a:fld>
             <a:endParaRPr lang="en-US" dirty="0"/>
           </a:p>
@@ -4322,7 +4327,7 @@
             <a:fld id="{B61BEF0D-F0BB-DE4B-95CE-6DB70DBA9567}" type="datetimeFigureOut">
               <a:rPr lang="en-US" dirty="0"/>
               <a:pPr/>
-              <a:t>10/6/2016</a:t>
+              <a:t>10/12/2016</a:t>
             </a:fld>
             <a:endParaRPr lang="en-US" dirty="0"/>
           </a:p>
@@ -4652,7 +4657,7 @@
             <a:fld id="{B61BEF0D-F0BB-DE4B-95CE-6DB70DBA9567}" type="datetimeFigureOut">
               <a:rPr lang="en-US" dirty="0"/>
               <a:pPr/>
-              <a:t>10/6/2016</a:t>
+              <a:t>10/12/2016</a:t>
             </a:fld>
             <a:endParaRPr lang="en-US" dirty="0"/>
           </a:p>
@@ -4994,7 +4999,7 @@
             <a:fld id="{B61BEF0D-F0BB-DE4B-95CE-6DB70DBA9567}" type="datetimeFigureOut">
               <a:rPr lang="en-US" dirty="0"/>
               <a:pPr/>
-              <a:t>10/6/2016</a:t>
+              <a:t>10/12/2016</a:t>
             </a:fld>
             <a:endParaRPr lang="en-US" dirty="0"/>
           </a:p>
@@ -7108,7 +7113,7 @@
             <a:fld id="{B61BEF0D-F0BB-DE4B-95CE-6DB70DBA9567}" type="datetimeFigureOut">
               <a:rPr lang="en-US" dirty="0"/>
               <a:pPr/>
-              <a:t>10/6/2016</a:t>
+              <a:t>10/12/2016</a:t>
             </a:fld>
             <a:endParaRPr lang="en-US" dirty="0"/>
           </a:p>
@@ -7689,7 +7694,7 @@
     </p:spTree>
     <p:extLst>
       <p:ext uri="{BB962C8B-B14F-4D97-AF65-F5344CB8AC3E}">
-        <p14:creationId xmlns:p14="http://schemas.microsoft.com/office/powerpoint/2010/main" val="2605786640"/>
+        <p14:creationId xmlns:p14="http://schemas.microsoft.com/office/powerpoint/2010/main" xmlns="" val="2605786640"/>
       </p:ext>
     </p:extLst>
   </p:cSld>
@@ -7793,7 +7798,7 @@
     </p:spTree>
     <p:extLst>
       <p:ext uri="{BB962C8B-B14F-4D97-AF65-F5344CB8AC3E}">
-        <p14:creationId xmlns:p14="http://schemas.microsoft.com/office/powerpoint/2010/main" val="2232112857"/>
+        <p14:creationId xmlns:p14="http://schemas.microsoft.com/office/powerpoint/2010/main" xmlns="" val="2232112857"/>
       </p:ext>
     </p:extLst>
   </p:cSld>
@@ -7885,9 +7890,629 @@
     </p:spTree>
     <p:extLst>
       <p:ext uri="{BB962C8B-B14F-4D97-AF65-F5344CB8AC3E}">
-        <p14:creationId xmlns:p14="http://schemas.microsoft.com/office/powerpoint/2010/main" val="3167874509"/>
+        <p14:creationId xmlns:p14="http://schemas.microsoft.com/office/powerpoint/2010/main" xmlns="" val="3167874509"/>
       </p:ext>
     </p:extLst>
+  </p:cSld>
+  <p:clrMapOvr>
+    <a:masterClrMapping/>
+  </p:clrMapOvr>
+</p:sld>
+</file>
+
+<file path=ppt/slides/slide4.xml><?xml version="1.0" encoding="utf-8"?>
+<p:sld xmlns:a="http://schemas.openxmlformats.org/drawingml/2006/main" xmlns:r="http://schemas.openxmlformats.org/officeDocument/2006/relationships" xmlns:p="http://schemas.openxmlformats.org/presentationml/2006/main">
+  <p:cSld>
+    <p:spTree>
+      <p:nvGrpSpPr>
+        <p:cNvPr id="1" name=""/>
+        <p:cNvGrpSpPr/>
+        <p:nvPr/>
+      </p:nvGrpSpPr>
+      <p:grpSpPr>
+        <a:xfrm>
+          <a:off x="0" y="0"/>
+          <a:ext cx="0" cy="0"/>
+          <a:chOff x="0" y="0"/>
+          <a:chExt cx="0" cy="0"/>
+        </a:xfrm>
+      </p:grpSpPr>
+      <p:sp>
+        <p:nvSpPr>
+          <p:cNvPr id="2" name="Título 1"/>
+          <p:cNvSpPr>
+            <a:spLocks noGrp="1"/>
+          </p:cNvSpPr>
+          <p:nvPr>
+            <p:ph type="title"/>
+          </p:nvPr>
+        </p:nvSpPr>
+        <p:spPr/>
+        <p:txBody>
+          <a:bodyPr/>
+          <a:lstStyle/>
+          <a:p>
+            <a:r>
+              <a:rPr lang="pt-BR" dirty="0" smtClean="0"/>
+              <a:t>Analise Sintática</a:t>
+            </a:r>
+            <a:endParaRPr lang="pt-BR" dirty="0"/>
+          </a:p>
+        </p:txBody>
+      </p:sp>
+      <p:sp>
+        <p:nvSpPr>
+          <p:cNvPr id="3" name="Espaço Reservado para Conteúdo 2"/>
+          <p:cNvSpPr>
+            <a:spLocks noGrp="1"/>
+          </p:cNvSpPr>
+          <p:nvPr>
+            <p:ph idx="1"/>
+          </p:nvPr>
+        </p:nvSpPr>
+        <p:spPr/>
+        <p:txBody>
+          <a:bodyPr/>
+          <a:lstStyle/>
+          <a:p>
+            <a:r>
+              <a:rPr lang="pt-BR" dirty="0" smtClean="0"/>
+              <a:t>Por meio das regras de produção da gramática, verifica se as </a:t>
+            </a:r>
+            <a:r>
+              <a:rPr lang="pt-BR" dirty="0" err="1" smtClean="0"/>
+              <a:t>sequências</a:t>
+            </a:r>
+            <a:r>
+              <a:rPr lang="pt-BR" dirty="0" smtClean="0"/>
+              <a:t> de </a:t>
+            </a:r>
+            <a:r>
+              <a:rPr lang="pt-BR" dirty="0" err="1" smtClean="0"/>
+              <a:t>tokens</a:t>
+            </a:r>
+            <a:r>
+              <a:rPr lang="pt-BR" dirty="0" smtClean="0"/>
+              <a:t> geradas na etapa anterior possuem uma sintaxe válida </a:t>
+            </a:r>
+            <a:endParaRPr lang="pt-BR" dirty="0"/>
+          </a:p>
+        </p:txBody>
+      </p:sp>
+    </p:spTree>
+  </p:cSld>
+  <p:clrMapOvr>
+    <a:masterClrMapping/>
+  </p:clrMapOvr>
+</p:sld>
+</file>
+
+<file path=ppt/slides/slide5.xml><?xml version="1.0" encoding="utf-8"?>
+<p:sld xmlns:a="http://schemas.openxmlformats.org/drawingml/2006/main" xmlns:r="http://schemas.openxmlformats.org/officeDocument/2006/relationships" xmlns:p="http://schemas.openxmlformats.org/presentationml/2006/main">
+  <p:cSld>
+    <p:spTree>
+      <p:nvGrpSpPr>
+        <p:cNvPr id="1" name=""/>
+        <p:cNvGrpSpPr/>
+        <p:nvPr/>
+      </p:nvGrpSpPr>
+      <p:grpSpPr>
+        <a:xfrm>
+          <a:off x="0" y="0"/>
+          <a:ext cx="0" cy="0"/>
+          <a:chOff x="0" y="0"/>
+          <a:chExt cx="0" cy="0"/>
+        </a:xfrm>
+      </p:grpSpPr>
+      <p:sp>
+        <p:nvSpPr>
+          <p:cNvPr id="2" name="Título 1"/>
+          <p:cNvSpPr>
+            <a:spLocks noGrp="1"/>
+          </p:cNvSpPr>
+          <p:nvPr>
+            <p:ph type="title"/>
+          </p:nvPr>
+        </p:nvSpPr>
+        <p:spPr/>
+        <p:txBody>
+          <a:bodyPr/>
+          <a:lstStyle/>
+          <a:p>
+            <a:r>
+              <a:rPr lang="pt-BR" dirty="0" smtClean="0"/>
+              <a:t>Analise Semântica</a:t>
+            </a:r>
+            <a:endParaRPr lang="pt-BR" dirty="0"/>
+          </a:p>
+        </p:txBody>
+      </p:sp>
+      <p:sp>
+        <p:nvSpPr>
+          <p:cNvPr id="3" name="Espaço Reservado para Conteúdo 2"/>
+          <p:cNvSpPr>
+            <a:spLocks noGrp="1"/>
+          </p:cNvSpPr>
+          <p:nvPr>
+            <p:ph idx="1"/>
+          </p:nvPr>
+        </p:nvSpPr>
+        <p:spPr/>
+        <p:txBody>
+          <a:bodyPr/>
+          <a:lstStyle/>
+          <a:p>
+            <a:r>
+              <a:rPr lang="pt-BR" dirty="0" smtClean="0"/>
+              <a:t>Verifica e válida o significado das sentenças.</a:t>
+            </a:r>
+          </a:p>
+          <a:p>
+            <a:r>
+              <a:rPr lang="pt-BR" dirty="0" smtClean="0"/>
+              <a:t>Apontando erros como incompatibilidade do tipo atribuído com o esperado pela variável.  </a:t>
+            </a:r>
+          </a:p>
+          <a:p>
+            <a:pPr lvl="2"/>
+            <a:r>
+              <a:rPr lang="pt-BR" dirty="0" smtClean="0"/>
+              <a:t>Ex: </a:t>
+            </a:r>
+            <a:r>
+              <a:rPr lang="pt-BR" dirty="0" err="1" smtClean="0"/>
+              <a:t>int</a:t>
+            </a:r>
+            <a:r>
+              <a:rPr lang="pt-BR" dirty="0" smtClean="0"/>
+              <a:t> x = 1.888;</a:t>
+            </a:r>
+            <a:endParaRPr lang="pt-BR" dirty="0"/>
+          </a:p>
+        </p:txBody>
+      </p:sp>
+    </p:spTree>
+  </p:cSld>
+  <p:clrMapOvr>
+    <a:masterClrMapping/>
+  </p:clrMapOvr>
+</p:sld>
+</file>
+
+<file path=ppt/slides/slide6.xml><?xml version="1.0" encoding="utf-8"?>
+<p:sld xmlns:a="http://schemas.openxmlformats.org/drawingml/2006/main" xmlns:r="http://schemas.openxmlformats.org/officeDocument/2006/relationships" xmlns:p="http://schemas.openxmlformats.org/presentationml/2006/main">
+  <p:cSld>
+    <p:spTree>
+      <p:nvGrpSpPr>
+        <p:cNvPr id="1" name=""/>
+        <p:cNvGrpSpPr/>
+        <p:nvPr/>
+      </p:nvGrpSpPr>
+      <p:grpSpPr>
+        <a:xfrm>
+          <a:off x="0" y="0"/>
+          <a:ext cx="0" cy="0"/>
+          <a:chOff x="0" y="0"/>
+          <a:chExt cx="0" cy="0"/>
+        </a:xfrm>
+      </p:grpSpPr>
+      <p:sp>
+        <p:nvSpPr>
+          <p:cNvPr id="2" name="Título 1"/>
+          <p:cNvSpPr>
+            <a:spLocks noGrp="1"/>
+          </p:cNvSpPr>
+          <p:nvPr>
+            <p:ph type="title"/>
+          </p:nvPr>
+        </p:nvSpPr>
+        <p:spPr/>
+        <p:txBody>
+          <a:bodyPr/>
+          <a:lstStyle/>
+          <a:p>
+            <a:r>
+              <a:rPr lang="pt-BR" dirty="0" smtClean="0"/>
+              <a:t>Nossa linguagem</a:t>
+            </a:r>
+            <a:endParaRPr lang="pt-BR" dirty="0"/>
+          </a:p>
+        </p:txBody>
+      </p:sp>
+      <p:sp>
+        <p:nvSpPr>
+          <p:cNvPr id="7" name="Espaço Reservado para Conteúdo 6"/>
+          <p:cNvSpPr>
+            <a:spLocks noGrp="1"/>
+          </p:cNvSpPr>
+          <p:nvPr>
+            <p:ph idx="1"/>
+          </p:nvPr>
+        </p:nvSpPr>
+        <p:spPr/>
+        <p:txBody>
+          <a:bodyPr/>
+          <a:lstStyle/>
+          <a:p>
+            <a:r>
+              <a:rPr lang="pt-BR" dirty="0" smtClean="0"/>
+              <a:t>CORPO</a:t>
+            </a:r>
+          </a:p>
+          <a:p>
+            <a:r>
+              <a:rPr lang="pt-BR" dirty="0" smtClean="0"/>
+              <a:t>DECLARAÇÃO</a:t>
+            </a:r>
+          </a:p>
+          <a:p>
+            <a:r>
+              <a:rPr lang="pt-BR" dirty="0" smtClean="0"/>
+              <a:t>ATRIBUIÇÃO</a:t>
+            </a:r>
+          </a:p>
+          <a:p>
+            <a:r>
+              <a:rPr lang="pt-BR" dirty="0" smtClean="0"/>
+              <a:t>DECLARAÇÃO COM ATRIBUIÇÃO</a:t>
+            </a:r>
+          </a:p>
+          <a:p>
+            <a:r>
+              <a:rPr lang="pt-BR" dirty="0" smtClean="0"/>
+              <a:t>IF</a:t>
+            </a:r>
+          </a:p>
+          <a:p>
+            <a:r>
+              <a:rPr lang="pt-BR" dirty="0" smtClean="0"/>
+              <a:t>FOR</a:t>
+            </a:r>
+          </a:p>
+          <a:p>
+            <a:r>
+              <a:rPr lang="pt-BR" dirty="0" smtClean="0"/>
+              <a:t>EXPRESSÃO MATEMÁTICA</a:t>
+            </a:r>
+          </a:p>
+          <a:p>
+            <a:r>
+              <a:rPr lang="pt-BR" dirty="0" smtClean="0"/>
+              <a:t>EXPRESSÃO LÓGICA</a:t>
+            </a:r>
+          </a:p>
+          <a:p>
+            <a:r>
+              <a:rPr lang="pt-BR" dirty="0" smtClean="0"/>
+              <a:t>3 TIPOS</a:t>
+            </a:r>
+            <a:endParaRPr lang="pt-BR" dirty="0" smtClean="0"/>
+          </a:p>
+          <a:p>
+            <a:endParaRPr lang="pt-BR" dirty="0" smtClean="0"/>
+          </a:p>
+        </p:txBody>
+      </p:sp>
+    </p:spTree>
+  </p:cSld>
+  <p:clrMapOvr>
+    <a:masterClrMapping/>
+  </p:clrMapOvr>
+</p:sld>
+</file>
+
+<file path=ppt/slides/slide7.xml><?xml version="1.0" encoding="utf-8"?>
+<p:sld xmlns:a="http://schemas.openxmlformats.org/drawingml/2006/main" xmlns:r="http://schemas.openxmlformats.org/officeDocument/2006/relationships" xmlns:p="http://schemas.openxmlformats.org/presentationml/2006/main">
+  <p:cSld>
+    <p:spTree>
+      <p:nvGrpSpPr>
+        <p:cNvPr id="1" name=""/>
+        <p:cNvGrpSpPr/>
+        <p:nvPr/>
+      </p:nvGrpSpPr>
+      <p:grpSpPr>
+        <a:xfrm>
+          <a:off x="0" y="0"/>
+          <a:ext cx="0" cy="0"/>
+          <a:chOff x="0" y="0"/>
+          <a:chExt cx="0" cy="0"/>
+        </a:xfrm>
+      </p:grpSpPr>
+      <p:sp>
+        <p:nvSpPr>
+          <p:cNvPr id="2" name="Título 1"/>
+          <p:cNvSpPr>
+            <a:spLocks noGrp="1"/>
+          </p:cNvSpPr>
+          <p:nvPr>
+            <p:ph type="title"/>
+          </p:nvPr>
+        </p:nvSpPr>
+        <p:spPr/>
+        <p:txBody>
+          <a:bodyPr/>
+          <a:lstStyle/>
+          <a:p>
+            <a:r>
+              <a:rPr lang="pt-BR" dirty="0" smtClean="0"/>
+              <a:t>Principais regras de produção</a:t>
+            </a:r>
+            <a:endParaRPr lang="pt-BR" dirty="0"/>
+          </a:p>
+        </p:txBody>
+      </p:sp>
+      <p:sp>
+        <p:nvSpPr>
+          <p:cNvPr id="3" name="Espaço Reservado para Conteúdo 2"/>
+          <p:cNvSpPr>
+            <a:spLocks noGrp="1"/>
+          </p:cNvSpPr>
+          <p:nvPr>
+            <p:ph idx="1"/>
+          </p:nvPr>
+        </p:nvSpPr>
+        <p:spPr>
+          <a:xfrm>
+            <a:off x="1724297" y="1619794"/>
+            <a:ext cx="9780315" cy="4846320"/>
+          </a:xfrm>
+        </p:spPr>
+        <p:txBody>
+          <a:bodyPr>
+            <a:normAutofit/>
+          </a:bodyPr>
+          <a:lstStyle/>
+          <a:p>
+            <a:r>
+              <a:rPr lang="en-US" sz="1400" dirty="0" smtClean="0"/>
+              <a:t>&lt;</a:t>
+            </a:r>
+            <a:r>
+              <a:rPr lang="en-US" sz="1400" b="1" dirty="0" smtClean="0"/>
+              <a:t>S</a:t>
+            </a:r>
+            <a:r>
+              <a:rPr lang="en-US" sz="1400" dirty="0" smtClean="0"/>
+              <a:t>&gt; ::= &lt;PROGRAM_BEGIN&gt;&lt;BODY&gt;&lt;PROGRAM_END</a:t>
+            </a:r>
+            <a:r>
+              <a:rPr lang="en-US" sz="1400" dirty="0" smtClean="0"/>
+              <a:t>&gt;</a:t>
+            </a:r>
+          </a:p>
+          <a:p>
+            <a:endParaRPr lang="en-US" sz="1400" dirty="0" smtClean="0"/>
+          </a:p>
+          <a:p>
+            <a:r>
+              <a:rPr lang="en-US" sz="1400" dirty="0" smtClean="0"/>
+              <a:t>&lt;</a:t>
+            </a:r>
+            <a:r>
+              <a:rPr lang="en-US" sz="1400" b="1" dirty="0" smtClean="0"/>
+              <a:t>BODY</a:t>
+            </a:r>
+            <a:r>
+              <a:rPr lang="en-US" sz="1400" dirty="0" smtClean="0"/>
+              <a:t>&gt; ::= (&lt;DECLARATION&gt; | &lt;ATRIBUTION&gt;&lt;SEMICOLON&gt; | &lt;IF_BLOCK&gt; | &lt;FOR_BLOCK</a:t>
+            </a:r>
+            <a:r>
+              <a:rPr lang="en-US" sz="1400" dirty="0" smtClean="0"/>
+              <a:t>&gt;)+</a:t>
+            </a:r>
+          </a:p>
+          <a:p>
+            <a:endParaRPr lang="en-US" sz="1400" dirty="0" smtClean="0"/>
+          </a:p>
+          <a:p>
+            <a:r>
+              <a:rPr lang="en-US" sz="1400" dirty="0" smtClean="0"/>
+              <a:t>&lt;</a:t>
+            </a:r>
+            <a:r>
+              <a:rPr lang="en-US" sz="1400" b="1" dirty="0" smtClean="0"/>
+              <a:t>DECLARATION</a:t>
+            </a:r>
+            <a:r>
+              <a:rPr lang="en-US" sz="1400" dirty="0" smtClean="0"/>
+              <a:t>&gt; ::= &lt;TYPE&gt;&lt;ID&gt;(&lt;COMMA&gt;&lt;ID&gt;)*&lt;SEMICOLON&gt; CK</a:t>
+            </a:r>
+            <a:r>
+              <a:rPr lang="en-US" sz="1400" dirty="0" smtClean="0"/>
+              <a:t>&gt;)+</a:t>
+            </a:r>
+          </a:p>
+          <a:p>
+            <a:endParaRPr lang="en-US" sz="1400" dirty="0" smtClean="0"/>
+          </a:p>
+          <a:p>
+            <a:r>
+              <a:rPr lang="en-US" sz="1400" dirty="0" smtClean="0"/>
+              <a:t>&lt;</a:t>
+            </a:r>
+            <a:r>
+              <a:rPr lang="en-US" sz="1400" b="1" dirty="0" smtClean="0"/>
+              <a:t>ATRIBUTION</a:t>
+            </a:r>
+            <a:r>
+              <a:rPr lang="en-US" sz="1400" dirty="0" smtClean="0"/>
+              <a:t>&gt; ::= &lt;ID&gt;&lt;ASSIGN&gt; (&lt;MATH_EXPRESSION&gt;| &lt;NUMBER</a:t>
+            </a:r>
+            <a:r>
+              <a:rPr lang="en-US" sz="1400" dirty="0" smtClean="0"/>
+              <a:t>&gt;</a:t>
+            </a:r>
+            <a:br>
+              <a:rPr lang="en-US" sz="1400" dirty="0" smtClean="0"/>
+            </a:br>
+            <a:r>
+              <a:rPr lang="en-US" sz="1400" dirty="0" smtClean="0"/>
+              <a:t>							 </a:t>
+            </a:r>
+            <a:r>
+              <a:rPr lang="en-US" sz="1400" dirty="0" smtClean="0"/>
+              <a:t>| </a:t>
+            </a:r>
+            <a:r>
+              <a:rPr lang="en-US" sz="1400" dirty="0" smtClean="0"/>
+              <a:t> &lt;</a:t>
+            </a:r>
+            <a:r>
+              <a:rPr lang="en-US" sz="1400" dirty="0" smtClean="0"/>
+              <a:t>STRING_DELIMITER&gt;&lt;ID&gt;&lt;STRING_DELIMITER&gt; | &lt;ID</a:t>
+            </a:r>
+            <a:r>
+              <a:rPr lang="en-US" sz="1400" dirty="0" smtClean="0"/>
+              <a:t>&gt;)</a:t>
+            </a:r>
+          </a:p>
+          <a:p>
+            <a:endParaRPr lang="en-US" sz="1400" dirty="0" smtClean="0"/>
+          </a:p>
+          <a:p>
+            <a:r>
+              <a:rPr lang="en-US" sz="1400" dirty="0" smtClean="0"/>
+              <a:t>&lt;</a:t>
+            </a:r>
+            <a:r>
+              <a:rPr lang="en-US" sz="1400" b="1" dirty="0" smtClean="0"/>
+              <a:t>IF_BLOCK</a:t>
+            </a:r>
+            <a:r>
+              <a:rPr lang="en-US" sz="1400" dirty="0" smtClean="0"/>
+              <a:t>&gt; ::= &lt;IF&gt;&lt;LOGIC_EXPRESSION&gt;&lt;THEN&gt;&lt;BODY&gt;(&lt;ELSE&gt;&lt;BODY&gt;)? &lt;END_IF</a:t>
+            </a:r>
+            <a:r>
+              <a:rPr lang="en-US" sz="1400" dirty="0" smtClean="0"/>
+              <a:t>&gt;</a:t>
+            </a:r>
+          </a:p>
+          <a:p>
+            <a:endParaRPr lang="en-US" sz="1400" dirty="0" smtClean="0"/>
+          </a:p>
+          <a:p>
+            <a:r>
+              <a:rPr lang="en-US" sz="1400" dirty="0" smtClean="0"/>
+              <a:t>&lt;</a:t>
+            </a:r>
+            <a:r>
+              <a:rPr lang="en-US" sz="1400" b="1" dirty="0" smtClean="0"/>
+              <a:t>FOR_BLOCK</a:t>
+            </a:r>
+            <a:r>
+              <a:rPr lang="en-US" sz="1400" dirty="0" smtClean="0"/>
+              <a:t>&gt; ::= &lt;FOR&gt;((&lt;TYPE&gt;&lt;ATRIBUTION&gt;) | &lt;NUMBER&gt;) &lt;TO&gt; </a:t>
+            </a:r>
+            <a:r>
+              <a:rPr lang="en-US" sz="1400" dirty="0" smtClean="0"/>
+              <a:t/>
+            </a:r>
+            <a:br>
+              <a:rPr lang="en-US" sz="1400" dirty="0" smtClean="0"/>
+            </a:br>
+            <a:r>
+              <a:rPr lang="en-US" sz="1400" dirty="0" smtClean="0"/>
+              <a:t>						&lt;</a:t>
+            </a:r>
+            <a:r>
+              <a:rPr lang="en-US" sz="1400" dirty="0" smtClean="0"/>
+              <a:t>LOGIC_EXPRESSION&gt; &lt;DOING&gt; &lt;MATH_EXPRESSION&gt; </a:t>
+            </a:r>
+            <a:r>
+              <a:rPr lang="en-US" sz="1400" dirty="0" smtClean="0"/>
+              <a:t/>
+            </a:r>
+            <a:br>
+              <a:rPr lang="en-US" sz="1400" dirty="0" smtClean="0"/>
+            </a:br>
+            <a:r>
+              <a:rPr lang="en-US" sz="1400" dirty="0" smtClean="0"/>
+              <a:t>											&lt;</a:t>
+            </a:r>
+            <a:r>
+              <a:rPr lang="en-US" sz="1400" dirty="0" smtClean="0"/>
+              <a:t>MOREOVER&gt; &lt;BODY&gt; &lt;END_FOR&gt;</a:t>
+            </a:r>
+            <a:endParaRPr lang="pt-BR" sz="1400" dirty="0"/>
+          </a:p>
+        </p:txBody>
+      </p:sp>
+    </p:spTree>
+  </p:cSld>
+  <p:clrMapOvr>
+    <a:masterClrMapping/>
+  </p:clrMapOvr>
+</p:sld>
+</file>
+
+<file path=ppt/slides/slide8.xml><?xml version="1.0" encoding="utf-8"?>
+<p:sld xmlns:a="http://schemas.openxmlformats.org/drawingml/2006/main" xmlns:r="http://schemas.openxmlformats.org/officeDocument/2006/relationships" xmlns:p="http://schemas.openxmlformats.org/presentationml/2006/main">
+  <p:cSld>
+    <p:spTree>
+      <p:nvGrpSpPr>
+        <p:cNvPr id="1" name=""/>
+        <p:cNvGrpSpPr/>
+        <p:nvPr/>
+      </p:nvGrpSpPr>
+      <p:grpSpPr>
+        <a:xfrm>
+          <a:off x="0" y="0"/>
+          <a:ext cx="0" cy="0"/>
+          <a:chOff x="0" y="0"/>
+          <a:chExt cx="0" cy="0"/>
+        </a:xfrm>
+      </p:grpSpPr>
+      <p:sp>
+        <p:nvSpPr>
+          <p:cNvPr id="2" name="Título 1"/>
+          <p:cNvSpPr>
+            <a:spLocks noGrp="1"/>
+          </p:cNvSpPr>
+          <p:nvPr>
+            <p:ph type="title"/>
+          </p:nvPr>
+        </p:nvSpPr>
+        <p:spPr/>
+        <p:txBody>
+          <a:bodyPr/>
+          <a:lstStyle/>
+          <a:p>
+            <a:r>
+              <a:rPr lang="pt-BR" dirty="0" smtClean="0"/>
+              <a:t>Exemplo programa válido.</a:t>
+            </a:r>
+            <a:endParaRPr lang="pt-BR" dirty="0"/>
+          </a:p>
+        </p:txBody>
+      </p:sp>
+      <p:sp>
+        <p:nvSpPr>
+          <p:cNvPr id="3" name="Espaço Reservado para Conteúdo 2"/>
+          <p:cNvSpPr>
+            <a:spLocks noGrp="1"/>
+          </p:cNvSpPr>
+          <p:nvPr>
+            <p:ph idx="1"/>
+          </p:nvPr>
+        </p:nvSpPr>
+        <p:spPr/>
+        <p:txBody>
+          <a:bodyPr/>
+          <a:lstStyle/>
+          <a:p>
+            <a:r>
+              <a:rPr lang="pt-BR" dirty="0" smtClean="0"/>
+              <a:t>Demonstração </a:t>
+            </a:r>
+            <a:r>
+              <a:rPr lang="pt-BR" smtClean="0"/>
+              <a:t>ao vivo...</a:t>
+            </a:r>
+            <a:endParaRPr lang="pt-BR" dirty="0"/>
+          </a:p>
+        </p:txBody>
+      </p:sp>
+    </p:spTree>
   </p:cSld>
   <p:clrMapOvr>
     <a:masterClrMapping/>
@@ -7938,7 +8563,7 @@
     </a:clrScheme>
     <a:fontScheme name="Wisp">
       <a:majorFont>
-        <a:latin typeface="Century Gothic" panose="020B0502020202020204"/>
+        <a:latin typeface="Century Gothic"/>
         <a:ea typeface=""/>
         <a:cs typeface=""/>
         <a:font script="Jpan" typeface="メイリオ"/>
@@ -7973,7 +8598,7 @@
         <a:font script="Geor" typeface="Sylfaen"/>
       </a:majorFont>
       <a:minorFont>
-        <a:latin typeface="Century Gothic" panose="020B0502020202020204"/>
+        <a:latin typeface="Century Gothic"/>
         <a:ea typeface=""/>
         <a:cs typeface=""/>
         <a:font script="Jpan" typeface="メイリオ"/>
@@ -8132,7 +8757,7 @@
   <a:extraClrSchemeLst/>
   <a:extLst>
     <a:ext uri="{05A4C25C-085E-4340-85A3-A5531E510DB2}">
-      <thm15:themeFamily xmlns:thm15="http://schemas.microsoft.com/office/thememl/2012/main" name="Wisp" id="{7CB32D59-10C0-40DD-B7BD-2E94284A981C}" vid="{24B1A44C-C006-48B2-A4D7-E5549B3D8CD4}"/>
+      <thm15:themeFamily xmlns:thm15="http://schemas.microsoft.com/office/thememl/2012/main" xmlns="" name="Wisp" id="{7CB32D59-10C0-40DD-B7BD-2E94284A981C}" vid="{24B1A44C-C006-48B2-A4D7-E5549B3D8CD4}"/>
     </a:ext>
   </a:extLst>
 </a:theme>

</xml_diff>